<commit_message>
Updated the conclusion page
</commit_message>
<xml_diff>
--- a/India & Neighbours PPG Bilateral Debt Analysis.pptx
+++ b/India & Neighbours PPG Bilateral Debt Analysis.pptx
@@ -5,10 +5,10 @@
     <p:sldMasterId id="2147483648" r:id="rId1"/>
   </p:sldMasterIdLst>
   <p:notesMasterIdLst>
-    <p:notesMasterId r:id="rId13"/>
+    <p:notesMasterId r:id="rId14"/>
   </p:notesMasterIdLst>
   <p:handoutMasterIdLst>
-    <p:handoutMasterId r:id="rId14"/>
+    <p:handoutMasterId r:id="rId15"/>
   </p:handoutMasterIdLst>
   <p:sldIdLst>
     <p:sldId id="318" r:id="rId2"/>
@@ -22,11 +22,12 @@
     <p:sldId id="335" r:id="rId10"/>
     <p:sldId id="336" r:id="rId11"/>
     <p:sldId id="337" r:id="rId12"/>
+    <p:sldId id="339" r:id="rId13"/>
   </p:sldIdLst>
   <p:sldSz cx="12188825" cy="6858000"/>
   <p:notesSz cx="6858000" cy="9144000"/>
   <p:custDataLst>
-    <p:tags r:id="rId15"/>
+    <p:tags r:id="rId16"/>
   </p:custDataLst>
   <p:defaultTextStyle>
     <a:defPPr>
@@ -287,7 +288,7 @@
           <a:p>
             <a:fld id="{8669AFDC-7658-4951-B0FF-52DFF2A93C0A}" type="datetimeFigureOut">
               <a:rPr lang="en-US" smtClean="0"/>
-              <a:t>8/18/2022</a:t>
+              <a:t>8/23/2022</a:t>
             </a:fld>
             <a:endParaRPr lang="en-US"/>
           </a:p>
@@ -452,7 +453,7 @@
           <a:p>
             <a:fld id="{3ABD2D7A-D230-4F91-BD59-0A39C2703BA8}" type="datetimeFigureOut">
               <a:rPr lang="en-US" smtClean="0"/>
-              <a:t>8/18/2022</a:t>
+              <a:t>8/23/2022</a:t>
             </a:fld>
             <a:endParaRPr lang="en-US"/>
           </a:p>
@@ -1211,7 +1212,7 @@
           <a:p>
             <a:fld id="{03F41C87-7AD9-4845-A077-840E4A0F3F06}" type="datetimeFigureOut">
               <a:rPr lang="en-US"/>
-              <a:t>8/18/2022</a:t>
+              <a:t>8/23/2022</a:t>
             </a:fld>
             <a:endParaRPr/>
           </a:p>
@@ -1416,7 +1417,7 @@
           <a:p>
             <a:fld id="{03F41C87-7AD9-4845-A077-840E4A0F3F06}" type="datetimeFigureOut">
               <a:rPr lang="en-US"/>
-              <a:t>8/18/2022</a:t>
+              <a:t>8/23/2022</a:t>
             </a:fld>
             <a:endParaRPr/>
           </a:p>
@@ -1649,7 +1650,7 @@
           <a:p>
             <a:fld id="{03F41C87-7AD9-4845-A077-840E4A0F3F06}" type="datetimeFigureOut">
               <a:rPr lang="en-US"/>
-              <a:t>8/18/2022</a:t>
+              <a:t>8/23/2022</a:t>
             </a:fld>
             <a:endParaRPr/>
           </a:p>
@@ -2065,7 +2066,7 @@
           <a:p>
             <a:fld id="{03F41C87-7AD9-4845-A077-840E4A0F3F06}" type="datetimeFigureOut">
               <a:rPr lang="en-US"/>
-              <a:t>8/18/2022</a:t>
+              <a:t>8/23/2022</a:t>
             </a:fld>
             <a:endParaRPr/>
           </a:p>
@@ -2425,7 +2426,7 @@
           <a:p>
             <a:fld id="{03F41C87-7AD9-4845-A077-840E4A0F3F06}" type="datetimeFigureOut">
               <a:rPr lang="en-US"/>
-              <a:t>8/18/2022</a:t>
+              <a:t>8/23/2022</a:t>
             </a:fld>
             <a:endParaRPr/>
           </a:p>
@@ -2933,7 +2934,7 @@
           <a:p>
             <a:fld id="{03F41C87-7AD9-4845-A077-840E4A0F3F06}" type="datetimeFigureOut">
               <a:rPr lang="en-US"/>
-              <a:t>8/18/2022</a:t>
+              <a:t>8/23/2022</a:t>
             </a:fld>
             <a:endParaRPr/>
           </a:p>
@@ -3114,7 +3115,7 @@
           <a:p>
             <a:fld id="{03F41C87-7AD9-4845-A077-840E4A0F3F06}" type="datetimeFigureOut">
               <a:rPr lang="en-US"/>
-              <a:t>8/18/2022</a:t>
+              <a:t>8/23/2022</a:t>
             </a:fld>
             <a:endParaRPr/>
           </a:p>
@@ -3262,7 +3263,7 @@
           <a:p>
             <a:fld id="{03F41C87-7AD9-4845-A077-840E4A0F3F06}" type="datetimeFigureOut">
               <a:rPr lang="en-US"/>
-              <a:t>8/18/2022</a:t>
+              <a:t>8/23/2022</a:t>
             </a:fld>
             <a:endParaRPr/>
           </a:p>
@@ -3575,7 +3576,7 @@
           <a:p>
             <a:fld id="{03F41C87-7AD9-4845-A077-840E4A0F3F06}" type="datetimeFigureOut">
               <a:rPr lang="en-US"/>
-              <a:t>8/18/2022</a:t>
+              <a:t>8/23/2022</a:t>
             </a:fld>
             <a:endParaRPr/>
           </a:p>
@@ -4127,7 +4128,7 @@
             <a:fld id="{03F41C87-7AD9-4845-A077-840E4A0F3F06}" type="datetimeFigureOut">
               <a:rPr lang="en-US" smtClean="0"/>
               <a:pPr/>
-              <a:t>8/18/2022</a:t>
+              <a:t>8/23/2022</a:t>
             </a:fld>
             <a:endParaRPr lang="en-US"/>
           </a:p>
@@ -5352,7 +5353,7 @@
           <a:p>
             <a:r>
               <a:rPr lang="en-IN" sz="1800" dirty="0"/>
-              <a:t>Total debt of Myanmar amounts to approx. 1 billion US$</a:t>
+              <a:t>Total debt of Myanmar amounts to approx. 2.8 billion US$</a:t>
             </a:r>
           </a:p>
           <a:p>
@@ -5408,13 +5409,13 @@
   <p:clrMapOvr>
     <a:masterClrMapping/>
   </p:clrMapOvr>
-  <mc:AlternateContent xmlns:mc="http://schemas.openxmlformats.org/markup-compatibility/2006">
-    <mc:Choice xmlns:p14="http://schemas.microsoft.com/office/powerpoint/2010/main" Requires="p14">
+  <mc:AlternateContent xmlns:mc="http://schemas.openxmlformats.org/markup-compatibility/2006" xmlns:p14="http://schemas.microsoft.com/office/powerpoint/2010/main">
+    <mc:Choice Requires="p14">
       <p:transition spd="med" p14:dur="700">
         <p:fade/>
       </p:transition>
     </mc:Choice>
-    <mc:Fallback>
+    <mc:Fallback xmlns="">
       <p:transition spd="med">
         <p:fade/>
       </p:transition>
@@ -5506,7 +5507,7 @@
           <a:p>
             <a:r>
               <a:rPr lang="en-IN" sz="1800" dirty="0"/>
-              <a:t>Total debt of Nepal amounts to approx. 9 billion US$</a:t>
+              <a:t>Total debt of Nepal amounts to approx. 90 million US$</a:t>
             </a:r>
           </a:p>
           <a:p>
@@ -5556,6 +5557,208 @@
     <p:extLst>
       <p:ext uri="{BB962C8B-B14F-4D97-AF65-F5344CB8AC3E}">
         <p14:creationId xmlns:p14="http://schemas.microsoft.com/office/powerpoint/2010/main" val="3678987751"/>
+      </p:ext>
+    </p:extLst>
+  </p:cSld>
+  <p:clrMapOvr>
+    <a:masterClrMapping/>
+  </p:clrMapOvr>
+  <mc:AlternateContent xmlns:mc="http://schemas.openxmlformats.org/markup-compatibility/2006" xmlns:p14="http://schemas.microsoft.com/office/powerpoint/2010/main">
+    <mc:Choice Requires="p14">
+      <p:transition spd="med" p14:dur="700">
+        <p:fade/>
+      </p:transition>
+    </mc:Choice>
+    <mc:Fallback xmlns="">
+      <p:transition spd="med">
+        <p:fade/>
+      </p:transition>
+    </mc:Fallback>
+  </mc:AlternateContent>
+</p:sld>
+</file>
+
+<file path=ppt/slides/slide12.xml><?xml version="1.0" encoding="utf-8"?>
+<p:sld xmlns:a="http://schemas.openxmlformats.org/drawingml/2006/main" xmlns:r="http://schemas.openxmlformats.org/officeDocument/2006/relationships" xmlns:p="http://schemas.openxmlformats.org/presentationml/2006/main">
+  <p:cSld>
+    <p:spTree>
+      <p:nvGrpSpPr>
+        <p:cNvPr id="1" name=""/>
+        <p:cNvGrpSpPr/>
+        <p:nvPr/>
+      </p:nvGrpSpPr>
+      <p:grpSpPr>
+        <a:xfrm>
+          <a:off x="0" y="0"/>
+          <a:ext cx="0" cy="0"/>
+          <a:chOff x="0" y="0"/>
+          <a:chExt cx="0" cy="0"/>
+        </a:xfrm>
+      </p:grpSpPr>
+      <p:sp>
+        <p:nvSpPr>
+          <p:cNvPr id="2" name="Title 1">
+            <a:extLst>
+              <a:ext uri="{FF2B5EF4-FFF2-40B4-BE49-F238E27FC236}">
+                <a16:creationId xmlns:a16="http://schemas.microsoft.com/office/drawing/2014/main" id="{F402C376-8C0A-78E6-3C76-B676EE9BF405}"/>
+              </a:ext>
+            </a:extLst>
+          </p:cNvPr>
+          <p:cNvSpPr>
+            <a:spLocks noGrp="1"/>
+          </p:cNvSpPr>
+          <p:nvPr>
+            <p:ph type="title"/>
+          </p:nvPr>
+        </p:nvSpPr>
+        <p:spPr/>
+        <p:txBody>
+          <a:bodyPr/>
+          <a:lstStyle/>
+          <a:p>
+            <a:pPr algn="ctr"/>
+            <a:r>
+              <a:rPr lang="en-IN" dirty="0"/>
+              <a:t>Conclusion</a:t>
+            </a:r>
+          </a:p>
+        </p:txBody>
+      </p:sp>
+      <p:sp>
+        <p:nvSpPr>
+          <p:cNvPr id="3" name="Content Placeholder 2">
+            <a:extLst>
+              <a:ext uri="{FF2B5EF4-FFF2-40B4-BE49-F238E27FC236}">
+                <a16:creationId xmlns:a16="http://schemas.microsoft.com/office/drawing/2014/main" id="{3C324661-EF13-9387-7D6D-8E8C33D11818}"/>
+              </a:ext>
+            </a:extLst>
+          </p:cNvPr>
+          <p:cNvSpPr>
+            <a:spLocks noGrp="1"/>
+          </p:cNvSpPr>
+          <p:nvPr>
+            <p:ph idx="1"/>
+          </p:nvPr>
+        </p:nvSpPr>
+        <p:spPr/>
+        <p:txBody>
+          <a:bodyPr>
+            <a:normAutofit/>
+          </a:bodyPr>
+          <a:lstStyle/>
+          <a:p>
+            <a:r>
+              <a:rPr lang="en-US" sz="1800" b="0" i="0" dirty="0">
+                <a:solidFill>
+                  <a:srgbClr val="000000"/>
+                </a:solidFill>
+                <a:effectLst/>
+                <a:latin typeface="Verdana" panose="020B0604030504040204" pitchFamily="34" charset="0"/>
+              </a:rPr>
+              <a:t>Total PPG Bilateral Lending has increased from less than 500 million $ in 2000 to about 45 billion $ in 2020</a:t>
+            </a:r>
+          </a:p>
+          <a:p>
+            <a:r>
+              <a:rPr lang="en-US" sz="1800" dirty="0">
+                <a:solidFill>
+                  <a:srgbClr val="000000"/>
+                </a:solidFill>
+                <a:latin typeface="Verdana" panose="020B0604030504040204" pitchFamily="34" charset="0"/>
+              </a:rPr>
+              <a:t>Bhutan has been the biggest debtor country receiving almost 18 billion $ over the period of 20 years</a:t>
+            </a:r>
+            <a:endParaRPr lang="en-US" sz="1800" b="0" i="0" dirty="0">
+              <a:solidFill>
+                <a:srgbClr val="000000"/>
+              </a:solidFill>
+              <a:effectLst/>
+              <a:latin typeface="Verdana" panose="020B0604030504040204" pitchFamily="34" charset="0"/>
+            </a:endParaRPr>
+          </a:p>
+          <a:p>
+            <a:r>
+              <a:rPr lang="en-US" sz="1800" b="0" i="0" dirty="0">
+                <a:solidFill>
+                  <a:srgbClr val="000000"/>
+                </a:solidFill>
+                <a:effectLst/>
+                <a:latin typeface="Verdana" panose="020B0604030504040204" pitchFamily="34" charset="0"/>
+              </a:rPr>
+              <a:t>Nepal has received the least bilateral lending amounting to less than 1 billion $</a:t>
+            </a:r>
+          </a:p>
+          <a:p>
+            <a:r>
+              <a:rPr lang="en-US" sz="1800" dirty="0">
+                <a:solidFill>
+                  <a:srgbClr val="000000"/>
+                </a:solidFill>
+                <a:latin typeface="Verdana" panose="020B0604030504040204" pitchFamily="34" charset="0"/>
+              </a:rPr>
+              <a:t>Total bilateral lending show a positive growth rate since last 20 years</a:t>
+            </a:r>
+          </a:p>
+          <a:p>
+            <a:r>
+              <a:rPr lang="en-US" sz="1800" dirty="0">
+                <a:solidFill>
+                  <a:srgbClr val="000000"/>
+                </a:solidFill>
+                <a:latin typeface="Verdana" panose="020B0604030504040204" pitchFamily="34" charset="0"/>
+              </a:rPr>
+              <a:t>Total bilateral lending to </a:t>
+            </a:r>
+            <a:r>
+              <a:rPr lang="en-US" sz="1800" dirty="0" err="1">
+                <a:solidFill>
+                  <a:srgbClr val="000000"/>
+                </a:solidFill>
+                <a:latin typeface="Verdana" panose="020B0604030504040204" pitchFamily="34" charset="0"/>
+              </a:rPr>
+              <a:t>neighbouring</a:t>
+            </a:r>
+            <a:r>
+              <a:rPr lang="en-US" sz="1800" dirty="0">
+                <a:solidFill>
+                  <a:srgbClr val="000000"/>
+                </a:solidFill>
+                <a:latin typeface="Verdana" panose="020B0604030504040204" pitchFamily="34" charset="0"/>
+              </a:rPr>
+              <a:t> countries is approx. 1.2% of overall GDP of India </a:t>
+            </a:r>
+            <a:endParaRPr lang="en-US" sz="1800" b="0" i="0" dirty="0">
+              <a:solidFill>
+                <a:srgbClr val="000000"/>
+              </a:solidFill>
+              <a:effectLst/>
+              <a:latin typeface="Verdana" panose="020B0604030504040204" pitchFamily="34" charset="0"/>
+            </a:endParaRPr>
+          </a:p>
+          <a:p>
+            <a:r>
+              <a:rPr lang="en-US" sz="1800" dirty="0">
+                <a:solidFill>
+                  <a:srgbClr val="000000"/>
+                </a:solidFill>
+                <a:latin typeface="Verdana" panose="020B0604030504040204" pitchFamily="34" charset="0"/>
+              </a:rPr>
+              <a:t>In the event of default by any neighboring country in future, its impact on India’s financial sector will be minimal</a:t>
+            </a:r>
+            <a:endParaRPr lang="en-US" sz="1800" b="0" i="0" dirty="0">
+              <a:solidFill>
+                <a:srgbClr val="000000"/>
+              </a:solidFill>
+              <a:effectLst/>
+              <a:latin typeface="Verdana" panose="020B0604030504040204" pitchFamily="34" charset="0"/>
+            </a:endParaRPr>
+          </a:p>
+        </p:txBody>
+      </p:sp>
+    </p:spTree>
+    <p:extLst>
+      <p:ext uri="{BB962C8B-B14F-4D97-AF65-F5344CB8AC3E}">
+        <p14:creationId xmlns:p14="http://schemas.microsoft.com/office/powerpoint/2010/main" val="4036557411"/>
       </p:ext>
     </p:extLst>
   </p:cSld>
@@ -5969,7 +6172,7 @@
           <a:p>
             <a:r>
               <a:rPr lang="en-IN" sz="1800" dirty="0"/>
-              <a:t>Total bilateral lending by India amounts to approx. 39 billion US$</a:t>
+              <a:t>Total bilateral lending by India amounts to approx. 45 billion US$</a:t>
             </a:r>
           </a:p>
           <a:p>
@@ -6175,13 +6378,13 @@
   <p:clrMapOvr>
     <a:masterClrMapping/>
   </p:clrMapOvr>
-  <mc:AlternateContent xmlns:mc="http://schemas.openxmlformats.org/markup-compatibility/2006">
-    <mc:Choice xmlns:p14="http://schemas.microsoft.com/office/powerpoint/2010/main" Requires="p14">
+  <mc:AlternateContent xmlns:mc="http://schemas.openxmlformats.org/markup-compatibility/2006" xmlns:p14="http://schemas.microsoft.com/office/powerpoint/2010/main">
+    <mc:Choice Requires="p14">
       <p:transition spd="med" p14:dur="700">
         <p:fade/>
       </p:transition>
     </mc:Choice>
-    <mc:Fallback>
+    <mc:Fallback xmlns="">
       <p:transition spd="med">
         <p:fade/>
       </p:transition>
@@ -6478,13 +6681,13 @@
   <p:clrMapOvr>
     <a:masterClrMapping/>
   </p:clrMapOvr>
-  <mc:AlternateContent xmlns:mc="http://schemas.openxmlformats.org/markup-compatibility/2006">
-    <mc:Choice xmlns:p14="http://schemas.microsoft.com/office/powerpoint/2010/main" Requires="p14">
+  <mc:AlternateContent xmlns:mc="http://schemas.openxmlformats.org/markup-compatibility/2006" xmlns:p14="http://schemas.microsoft.com/office/powerpoint/2010/main">
+    <mc:Choice Requires="p14">
       <p:transition spd="med" p14:dur="700">
         <p:fade/>
       </p:transition>
     </mc:Choice>
-    <mc:Fallback>
+    <mc:Fallback xmlns="">
       <p:transition spd="med">
         <p:fade/>
       </p:transition>
@@ -6576,7 +6779,7 @@
           <a:p>
             <a:r>
               <a:rPr lang="en-IN" sz="1800" dirty="0"/>
-              <a:t>Total debt of Sri Lanka amounts to approx. 10 billion US$</a:t>
+              <a:t>Total debt of Sri Lanka amounts to approx. 9.5 billion US$</a:t>
             </a:r>
           </a:p>
           <a:p>
@@ -6632,13 +6835,13 @@
   <p:clrMapOvr>
     <a:masterClrMapping/>
   </p:clrMapOvr>
-  <mc:AlternateContent xmlns:mc="http://schemas.openxmlformats.org/markup-compatibility/2006">
-    <mc:Choice xmlns:p14="http://schemas.microsoft.com/office/powerpoint/2010/main" Requires="p14">
+  <mc:AlternateContent xmlns:mc="http://schemas.openxmlformats.org/markup-compatibility/2006" xmlns:p14="http://schemas.microsoft.com/office/powerpoint/2010/main">
+    <mc:Choice Requires="p14">
       <p:transition spd="med" p14:dur="700">
         <p:fade/>
       </p:transition>
     </mc:Choice>
-    <mc:Fallback>
+    <mc:Fallback xmlns="">
       <p:transition spd="med">
         <p:fade/>
       </p:transition>
@@ -6730,7 +6933,7 @@
           <a:p>
             <a:r>
               <a:rPr lang="en-IN" sz="1800" dirty="0"/>
-              <a:t>Total debt of Maldives amounts to approx. 2 billion US$</a:t>
+              <a:t>Total debt of Maldives amounts to approx. 1.8 billion US$</a:t>
             </a:r>
           </a:p>
           <a:p>
@@ -6786,13 +6989,13 @@
   <p:clrMapOvr>
     <a:masterClrMapping/>
   </p:clrMapOvr>
-  <mc:AlternateContent xmlns:mc="http://schemas.openxmlformats.org/markup-compatibility/2006">
-    <mc:Choice xmlns:p14="http://schemas.microsoft.com/office/powerpoint/2010/main" Requires="p14">
+  <mc:AlternateContent xmlns:mc="http://schemas.openxmlformats.org/markup-compatibility/2006" xmlns:p14="http://schemas.microsoft.com/office/powerpoint/2010/main">
+    <mc:Choice Requires="p14">
       <p:transition spd="med" p14:dur="700">
         <p:fade/>
       </p:transition>
     </mc:Choice>
-    <mc:Fallback>
+    <mc:Fallback xmlns="">
       <p:transition spd="med">
         <p:fade/>
       </p:transition>

</xml_diff>